<commit_message>
added imports and reference material
</commit_message>
<xml_diff>
--- a/Reference/KFF_colors.pptx
+++ b/Reference/KFF_colors.pptx
@@ -115,7 +115,7 @@
 <file path=ppt/revisionInfo.xml><?xml version="1.0" encoding="utf-8"?>
 <p1510:revInfo xmlns:a="http://schemas.openxmlformats.org/drawingml/2006/main" xmlns:r="http://schemas.openxmlformats.org/officeDocument/2006/relationships" xmlns:p1510="http://schemas.microsoft.com/office/powerpoint/2015/10/main">
   <p1510:revLst>
-    <p1510:client id="{B0C6DF4E-6BCC-4C73-B56B-312319E14906}" v="8" dt="2022-03-18T19:50:14.225"/>
+    <p1510:client id="{F816EC80-E11A-4F4B-91FD-A9734CAD148F}" v="1" dt="2022-03-25T22:09:16.240"/>
   </p1510:revLst>
 </p1510:revInfo>
 </file>
@@ -125,18 +125,18 @@
   <pc:docChgLst>
     <pc:chgData name="Patrick Drake" userId="4695e51e-8175-410b-be41-3ae9425cc76e" providerId="ADAL" clId="{B0C6DF4E-6BCC-4C73-B56B-312319E14906}"/>
     <pc:docChg chg="custSel modSld">
-      <pc:chgData name="Patrick Drake" userId="4695e51e-8175-410b-be41-3ae9425cc76e" providerId="ADAL" clId="{B0C6DF4E-6BCC-4C73-B56B-312319E14906}" dt="2022-03-18T19:50:14.225" v="17" actId="207"/>
+      <pc:chgData name="Patrick Drake" userId="4695e51e-8175-410b-be41-3ae9425cc76e" providerId="ADAL" clId="{B0C6DF4E-6BCC-4C73-B56B-312319E14906}" dt="2022-03-21T16:14:14.694" v="107" actId="20577"/>
       <pc:docMkLst>
         <pc:docMk/>
       </pc:docMkLst>
-      <pc:sldChg chg="addSp modSp">
-        <pc:chgData name="Patrick Drake" userId="4695e51e-8175-410b-be41-3ae9425cc76e" providerId="ADAL" clId="{B0C6DF4E-6BCC-4C73-B56B-312319E14906}" dt="2022-03-18T19:50:14.225" v="17" actId="207"/>
+      <pc:sldChg chg="addSp delSp modSp">
+        <pc:chgData name="Patrick Drake" userId="4695e51e-8175-410b-be41-3ae9425cc76e" providerId="ADAL" clId="{B0C6DF4E-6BCC-4C73-B56B-312319E14906}" dt="2022-03-21T16:14:14.694" v="107" actId="20577"/>
         <pc:sldMkLst>
           <pc:docMk/>
           <pc:sldMk cId="1558752139" sldId="256"/>
         </pc:sldMkLst>
         <pc:spChg chg="add mod">
-          <ac:chgData name="Patrick Drake" userId="4695e51e-8175-410b-be41-3ae9425cc76e" providerId="ADAL" clId="{B0C6DF4E-6BCC-4C73-B56B-312319E14906}" dt="2022-03-18T19:49:11.119" v="7" actId="1076"/>
+          <ac:chgData name="Patrick Drake" userId="4695e51e-8175-410b-be41-3ae9425cc76e" providerId="ADAL" clId="{B0C6DF4E-6BCC-4C73-B56B-312319E14906}" dt="2022-03-21T16:14:07.377" v="99" actId="20577"/>
           <ac:spMkLst>
             <pc:docMk/>
             <pc:sldMk cId="1558752139" sldId="256"/>
@@ -144,45 +144,141 @@
           </ac:spMkLst>
         </pc:spChg>
         <pc:spChg chg="add mod">
-          <ac:chgData name="Patrick Drake" userId="4695e51e-8175-410b-be41-3ae9425cc76e" providerId="ADAL" clId="{B0C6DF4E-6BCC-4C73-B56B-312319E14906}" dt="2022-03-18T19:50:14.225" v="17" actId="207"/>
+          <ac:chgData name="Patrick Drake" userId="4695e51e-8175-410b-be41-3ae9425cc76e" providerId="ADAL" clId="{B0C6DF4E-6BCC-4C73-B56B-312319E14906}" dt="2022-03-21T16:13:43.927" v="88" actId="207"/>
           <ac:spMkLst>
             <pc:docMk/>
             <pc:sldMk cId="1558752139" sldId="256"/>
             <ac:spMk id="3" creationId="{83221935-3979-429D-8526-5329D4A216E4}"/>
           </ac:spMkLst>
         </pc:spChg>
-        <pc:spChg chg="add mod">
-          <ac:chgData name="Patrick Drake" userId="4695e51e-8175-410b-be41-3ae9425cc76e" providerId="ADAL" clId="{B0C6DF4E-6BCC-4C73-B56B-312319E14906}" dt="2022-03-18T19:49:08.128" v="6" actId="1076"/>
+        <pc:spChg chg="add del mod">
+          <ac:chgData name="Patrick Drake" userId="4695e51e-8175-410b-be41-3ae9425cc76e" providerId="ADAL" clId="{B0C6DF4E-6BCC-4C73-B56B-312319E14906}" dt="2022-03-21T16:11:44.321" v="40"/>
           <ac:spMkLst>
             <pc:docMk/>
             <pc:sldMk cId="1558752139" sldId="256"/>
             <ac:spMk id="4" creationId="{FC2EF9FE-776C-4C2F-84FE-D9BCB96FA50E}"/>
           </ac:spMkLst>
         </pc:spChg>
-        <pc:spChg chg="add mod">
-          <ac:chgData name="Patrick Drake" userId="4695e51e-8175-410b-be41-3ae9425cc76e" providerId="ADAL" clId="{B0C6DF4E-6BCC-4C73-B56B-312319E14906}" dt="2022-03-18T19:49:16.695" v="9" actId="1076"/>
+        <pc:spChg chg="add del mod">
+          <ac:chgData name="Patrick Drake" userId="4695e51e-8175-410b-be41-3ae9425cc76e" providerId="ADAL" clId="{B0C6DF4E-6BCC-4C73-B56B-312319E14906}" dt="2022-03-21T16:11:44.321" v="38" actId="478"/>
           <ac:spMkLst>
             <pc:docMk/>
             <pc:sldMk cId="1558752139" sldId="256"/>
             <ac:spMk id="5" creationId="{B2EC040B-B782-4391-B179-2DA1C08AA6E5}"/>
           </ac:spMkLst>
         </pc:spChg>
-        <pc:spChg chg="add mod">
-          <ac:chgData name="Patrick Drake" userId="4695e51e-8175-410b-be41-3ae9425cc76e" providerId="ADAL" clId="{B0C6DF4E-6BCC-4C73-B56B-312319E14906}" dt="2022-03-18T19:49:25.686" v="14" actId="1076"/>
+        <pc:spChg chg="add del mod">
+          <ac:chgData name="Patrick Drake" userId="4695e51e-8175-410b-be41-3ae9425cc76e" providerId="ADAL" clId="{B0C6DF4E-6BCC-4C73-B56B-312319E14906}" dt="2022-03-21T16:11:46.986" v="44"/>
           <ac:spMkLst>
             <pc:docMk/>
             <pc:sldMk cId="1558752139" sldId="256"/>
             <ac:spMk id="7" creationId="{6A54373B-C787-4933-9DB6-F40854724190}"/>
           </ac:spMkLst>
         </pc:spChg>
-        <pc:spChg chg="add mod">
-          <ac:chgData name="Patrick Drake" userId="4695e51e-8175-410b-be41-3ae9425cc76e" providerId="ADAL" clId="{B0C6DF4E-6BCC-4C73-B56B-312319E14906}" dt="2022-03-18T19:49:23.024" v="13" actId="1076"/>
+        <pc:spChg chg="add del mod">
+          <ac:chgData name="Patrick Drake" userId="4695e51e-8175-410b-be41-3ae9425cc76e" providerId="ADAL" clId="{B0C6DF4E-6BCC-4C73-B56B-312319E14906}" dt="2022-03-21T16:11:46.985" v="42" actId="478"/>
           <ac:spMkLst>
             <pc:docMk/>
             <pc:sldMk cId="1558752139" sldId="256"/>
             <ac:spMk id="8" creationId="{F8917A5B-93CF-440A-A043-6B49D1C09F6F}"/>
           </ac:spMkLst>
         </pc:spChg>
+        <pc:spChg chg="add mod">
+          <ac:chgData name="Patrick Drake" userId="4695e51e-8175-410b-be41-3ae9425cc76e" providerId="ADAL" clId="{B0C6DF4E-6BCC-4C73-B56B-312319E14906}" dt="2022-03-21T16:14:09.380" v="101" actId="20577"/>
+          <ac:spMkLst>
+            <pc:docMk/>
+            <pc:sldMk cId="1558752139" sldId="256"/>
+            <ac:spMk id="9" creationId="{7A95581B-74D6-4CD2-B1AA-8272F764B9B9}"/>
+          </ac:spMkLst>
+        </pc:spChg>
+        <pc:spChg chg="add mod">
+          <ac:chgData name="Patrick Drake" userId="4695e51e-8175-410b-be41-3ae9425cc76e" providerId="ADAL" clId="{B0C6DF4E-6BCC-4C73-B56B-312319E14906}" dt="2022-03-21T16:14:11.505" v="103" actId="20577"/>
+          <ac:spMkLst>
+            <pc:docMk/>
+            <pc:sldMk cId="1558752139" sldId="256"/>
+            <ac:spMk id="10" creationId="{23555D8A-FC02-4289-B1B5-7B53F9D0EB62}"/>
+          </ac:spMkLst>
+        </pc:spChg>
+        <pc:spChg chg="add mod">
+          <ac:chgData name="Patrick Drake" userId="4695e51e-8175-410b-be41-3ae9425cc76e" providerId="ADAL" clId="{B0C6DF4E-6BCC-4C73-B56B-312319E14906}" dt="2022-03-21T16:14:12.971" v="105" actId="20577"/>
+          <ac:spMkLst>
+            <pc:docMk/>
+            <pc:sldMk cId="1558752139" sldId="256"/>
+            <ac:spMk id="11" creationId="{7E6D3160-411E-4DA8-9AE2-BD20ED7435CF}"/>
+          </ac:spMkLst>
+        </pc:spChg>
+        <pc:spChg chg="add mod">
+          <ac:chgData name="Patrick Drake" userId="4695e51e-8175-410b-be41-3ae9425cc76e" providerId="ADAL" clId="{B0C6DF4E-6BCC-4C73-B56B-312319E14906}" dt="2022-03-21T16:14:14.694" v="107" actId="20577"/>
+          <ac:spMkLst>
+            <pc:docMk/>
+            <pc:sldMk cId="1558752139" sldId="256"/>
+            <ac:spMk id="12" creationId="{996820F6-E946-43E4-9562-03F67DE07D06}"/>
+          </ac:spMkLst>
+        </pc:spChg>
+        <pc:grpChg chg="add mod">
+          <ac:chgData name="Patrick Drake" userId="4695e51e-8175-410b-be41-3ae9425cc76e" providerId="ADAL" clId="{B0C6DF4E-6BCC-4C73-B56B-312319E14906}" dt="2022-03-21T16:12:16.904" v="59" actId="164"/>
+          <ac:grpSpMkLst>
+            <pc:docMk/>
+            <pc:sldMk cId="1558752139" sldId="256"/>
+            <ac:grpSpMk id="13" creationId="{6F7F9E19-F70C-4253-BBA8-28E779380C9F}"/>
+          </ac:grpSpMkLst>
+        </pc:grpChg>
+        <pc:picChg chg="mod">
+          <ac:chgData name="Patrick Drake" userId="4695e51e-8175-410b-be41-3ae9425cc76e" providerId="ADAL" clId="{B0C6DF4E-6BCC-4C73-B56B-312319E14906}" dt="2022-03-21T16:12:16.904" v="59" actId="164"/>
+          <ac:picMkLst>
+            <pc:docMk/>
+            <pc:sldMk cId="1558752139" sldId="256"/>
+            <ac:picMk id="6" creationId="{B60620E8-C3C4-406F-95C8-391F0306BEB4}"/>
+          </ac:picMkLst>
+        </pc:picChg>
+      </pc:sldChg>
+    </pc:docChg>
+  </pc:docChgLst>
+  <pc:docChgLst>
+    <pc:chgData name="Patrick Drake" userId="4695e51e-8175-410b-be41-3ae9425cc76e" providerId="ADAL" clId="{F816EC80-E11A-4F4B-91FD-A9734CAD148F}"/>
+    <pc:docChg chg="custSel modSld">
+      <pc:chgData name="Patrick Drake" userId="4695e51e-8175-410b-be41-3ae9425cc76e" providerId="ADAL" clId="{F816EC80-E11A-4F4B-91FD-A9734CAD148F}" dt="2022-03-25T22:10:11.615" v="6" actId="478"/>
+      <pc:docMkLst>
+        <pc:docMk/>
+      </pc:docMkLst>
+      <pc:sldChg chg="addSp delSp modSp mod">
+        <pc:chgData name="Patrick Drake" userId="4695e51e-8175-410b-be41-3ae9425cc76e" providerId="ADAL" clId="{F816EC80-E11A-4F4B-91FD-A9734CAD148F}" dt="2022-03-25T22:10:11.615" v="6" actId="478"/>
+        <pc:sldMkLst>
+          <pc:docMk/>
+          <pc:sldMk cId="1558752139" sldId="256"/>
+        </pc:sldMkLst>
+        <pc:spChg chg="mod">
+          <ac:chgData name="Patrick Drake" userId="4695e51e-8175-410b-be41-3ae9425cc76e" providerId="ADAL" clId="{F816EC80-E11A-4F4B-91FD-A9734CAD148F}" dt="2022-03-25T22:09:42.867" v="3" actId="207"/>
+          <ac:spMkLst>
+            <pc:docMk/>
+            <pc:sldMk cId="1558752139" sldId="256"/>
+            <ac:spMk id="3" creationId="{83221935-3979-429D-8526-5329D4A216E4}"/>
+          </ac:spMkLst>
+        </pc:spChg>
+        <pc:spChg chg="add del mod">
+          <ac:chgData name="Patrick Drake" userId="4695e51e-8175-410b-be41-3ae9425cc76e" providerId="ADAL" clId="{F816EC80-E11A-4F4B-91FD-A9734CAD148F}" dt="2022-03-25T22:10:11.615" v="6" actId="478"/>
+          <ac:spMkLst>
+            <pc:docMk/>
+            <pc:sldMk cId="1558752139" sldId="256"/>
+            <ac:spMk id="14" creationId="{717B4857-191D-4915-904A-FF8F687C5DBA}"/>
+          </ac:spMkLst>
+        </pc:spChg>
+        <pc:grpChg chg="mod">
+          <ac:chgData name="Patrick Drake" userId="4695e51e-8175-410b-be41-3ae9425cc76e" providerId="ADAL" clId="{F816EC80-E11A-4F4B-91FD-A9734CAD148F}" dt="2022-03-25T22:09:06.392" v="0" actId="1076"/>
+          <ac:grpSpMkLst>
+            <pc:docMk/>
+            <pc:sldMk cId="1558752139" sldId="256"/>
+            <ac:grpSpMk id="13" creationId="{6F7F9E19-F70C-4253-BBA8-28E779380C9F}"/>
+          </ac:grpSpMkLst>
+        </pc:grpChg>
+        <pc:picChg chg="add del mod">
+          <ac:chgData name="Patrick Drake" userId="4695e51e-8175-410b-be41-3ae9425cc76e" providerId="ADAL" clId="{F816EC80-E11A-4F4B-91FD-A9734CAD148F}" dt="2022-03-25T22:10:11.615" v="6" actId="478"/>
+          <ac:picMkLst>
+            <pc:docMk/>
+            <pc:sldMk cId="1558752139" sldId="256"/>
+            <ac:picMk id="5" creationId="{E985787D-E48B-4C1F-B086-97A9214E3316}"/>
+          </ac:picMkLst>
+        </pc:picChg>
       </pc:sldChg>
     </pc:docChg>
   </pc:docChgLst>
@@ -336,7 +432,7 @@
           <a:p>
             <a:fld id="{46D519C6-55E0-49FB-B8BB-91DA255A62EC}" type="datetimeFigureOut">
               <a:rPr lang="en-US" smtClean="0"/>
-              <a:t>3/18/2022</a:t>
+              <a:t>3/25/2022</a:t>
             </a:fld>
             <a:endParaRPr lang="en-US"/>
           </a:p>
@@ -534,7 +630,7 @@
           <a:p>
             <a:fld id="{46D519C6-55E0-49FB-B8BB-91DA255A62EC}" type="datetimeFigureOut">
               <a:rPr lang="en-US" smtClean="0"/>
-              <a:t>3/18/2022</a:t>
+              <a:t>3/25/2022</a:t>
             </a:fld>
             <a:endParaRPr lang="en-US"/>
           </a:p>
@@ -742,7 +838,7 @@
           <a:p>
             <a:fld id="{46D519C6-55E0-49FB-B8BB-91DA255A62EC}" type="datetimeFigureOut">
               <a:rPr lang="en-US" smtClean="0"/>
-              <a:t>3/18/2022</a:t>
+              <a:t>3/25/2022</a:t>
             </a:fld>
             <a:endParaRPr lang="en-US"/>
           </a:p>
@@ -940,7 +1036,7 @@
           <a:p>
             <a:fld id="{46D519C6-55E0-49FB-B8BB-91DA255A62EC}" type="datetimeFigureOut">
               <a:rPr lang="en-US" smtClean="0"/>
-              <a:t>3/18/2022</a:t>
+              <a:t>3/25/2022</a:t>
             </a:fld>
             <a:endParaRPr lang="en-US"/>
           </a:p>
@@ -1215,7 +1311,7 @@
           <a:p>
             <a:fld id="{46D519C6-55E0-49FB-B8BB-91DA255A62EC}" type="datetimeFigureOut">
               <a:rPr lang="en-US" smtClean="0"/>
-              <a:t>3/18/2022</a:t>
+              <a:t>3/25/2022</a:t>
             </a:fld>
             <a:endParaRPr lang="en-US"/>
           </a:p>
@@ -1480,7 +1576,7 @@
           <a:p>
             <a:fld id="{46D519C6-55E0-49FB-B8BB-91DA255A62EC}" type="datetimeFigureOut">
               <a:rPr lang="en-US" smtClean="0"/>
-              <a:t>3/18/2022</a:t>
+              <a:t>3/25/2022</a:t>
             </a:fld>
             <a:endParaRPr lang="en-US"/>
           </a:p>
@@ -1892,7 +1988,7 @@
           <a:p>
             <a:fld id="{46D519C6-55E0-49FB-B8BB-91DA255A62EC}" type="datetimeFigureOut">
               <a:rPr lang="en-US" smtClean="0"/>
-              <a:t>3/18/2022</a:t>
+              <a:t>3/25/2022</a:t>
             </a:fld>
             <a:endParaRPr lang="en-US"/>
           </a:p>
@@ -2033,7 +2129,7 @@
           <a:p>
             <a:fld id="{46D519C6-55E0-49FB-B8BB-91DA255A62EC}" type="datetimeFigureOut">
               <a:rPr lang="en-US" smtClean="0"/>
-              <a:t>3/18/2022</a:t>
+              <a:t>3/25/2022</a:t>
             </a:fld>
             <a:endParaRPr lang="en-US"/>
           </a:p>
@@ -2146,7 +2242,7 @@
           <a:p>
             <a:fld id="{46D519C6-55E0-49FB-B8BB-91DA255A62EC}" type="datetimeFigureOut">
               <a:rPr lang="en-US" smtClean="0"/>
-              <a:t>3/18/2022</a:t>
+              <a:t>3/25/2022</a:t>
             </a:fld>
             <a:endParaRPr lang="en-US"/>
           </a:p>
@@ -2457,7 +2553,7 @@
           <a:p>
             <a:fld id="{46D519C6-55E0-49FB-B8BB-91DA255A62EC}" type="datetimeFigureOut">
               <a:rPr lang="en-US" smtClean="0"/>
-              <a:t>3/18/2022</a:t>
+              <a:t>3/25/2022</a:t>
             </a:fld>
             <a:endParaRPr lang="en-US"/>
           </a:p>
@@ -2745,7 +2841,7 @@
           <a:p>
             <a:fld id="{46D519C6-55E0-49FB-B8BB-91DA255A62EC}" type="datetimeFigureOut">
               <a:rPr lang="en-US" smtClean="0"/>
-              <a:t>3/18/2022</a:t>
+              <a:t>3/25/2022</a:t>
             </a:fld>
             <a:endParaRPr lang="en-US"/>
           </a:p>
@@ -2986,7 +3082,7 @@
           <a:p>
             <a:fld id="{46D519C6-55E0-49FB-B8BB-91DA255A62EC}" type="datetimeFigureOut">
               <a:rPr lang="en-US" smtClean="0"/>
-              <a:t>3/18/2022</a:t>
+              <a:t>3/25/2022</a:t>
             </a:fld>
             <a:endParaRPr lang="en-US"/>
           </a:p>
@@ -3403,211 +3499,6 @@
           <a:chExt cx="0" cy="0"/>
         </a:xfrm>
       </p:grpSpPr>
-      <p:pic>
-        <p:nvPicPr>
-          <p:cNvPr id="6" name="Picture 5">
-            <a:extLst>
-              <a:ext uri="{FF2B5EF4-FFF2-40B4-BE49-F238E27FC236}">
-                <a16:creationId xmlns:a16="http://schemas.microsoft.com/office/drawing/2014/main" id="{B60620E8-C3C4-406F-95C8-391F0306BEB4}"/>
-              </a:ext>
-            </a:extLst>
-          </p:cNvPr>
-          <p:cNvPicPr>
-            <a:picLocks noChangeAspect="1"/>
-          </p:cNvPicPr>
-          <p:nvPr/>
-        </p:nvPicPr>
-        <p:blipFill>
-          <a:blip r:embed="rId2"/>
-          <a:stretch>
-            <a:fillRect/>
-          </a:stretch>
-        </p:blipFill>
-        <p:spPr>
-          <a:xfrm rot="5400000">
-            <a:off x="281740" y="2649705"/>
-            <a:ext cx="2324100" cy="371475"/>
-          </a:xfrm>
-          <a:prstGeom prst="rect">
-            <a:avLst/>
-          </a:prstGeom>
-        </p:spPr>
-      </p:pic>
-      <p:sp>
-        <p:nvSpPr>
-          <p:cNvPr id="2" name="TextBox 1">
-            <a:extLst>
-              <a:ext uri="{FF2B5EF4-FFF2-40B4-BE49-F238E27FC236}">
-                <a16:creationId xmlns:a16="http://schemas.microsoft.com/office/drawing/2014/main" id="{FD6CD768-71BB-4466-B2C5-C838E5B32757}"/>
-              </a:ext>
-            </a:extLst>
-          </p:cNvPr>
-          <p:cNvSpPr txBox="1"/>
-          <p:nvPr/>
-        </p:nvSpPr>
-        <p:spPr>
-          <a:xfrm>
-            <a:off x="1781928" y="1673392"/>
-            <a:ext cx="1423359" cy="369332"/>
-          </a:xfrm>
-          <a:prstGeom prst="rect">
-            <a:avLst/>
-          </a:prstGeom>
-          <a:noFill/>
-        </p:spPr>
-        <p:txBody>
-          <a:bodyPr wrap="square" rtlCol="0">
-            <a:spAutoFit/>
-          </a:bodyPr>
-          <a:lstStyle/>
-          <a:p>
-            <a:r>
-              <a:rPr lang="en-US" dirty="0"/>
-              <a:t>#</a:t>
-            </a:r>
-          </a:p>
-        </p:txBody>
-      </p:sp>
-      <p:sp>
-        <p:nvSpPr>
-          <p:cNvPr id="4" name="TextBox 3">
-            <a:extLst>
-              <a:ext uri="{FF2B5EF4-FFF2-40B4-BE49-F238E27FC236}">
-                <a16:creationId xmlns:a16="http://schemas.microsoft.com/office/drawing/2014/main" id="{FC2EF9FE-776C-4C2F-84FE-D9BCB96FA50E}"/>
-              </a:ext>
-            </a:extLst>
-          </p:cNvPr>
-          <p:cNvSpPr txBox="1"/>
-          <p:nvPr/>
-        </p:nvSpPr>
-        <p:spPr>
-          <a:xfrm>
-            <a:off x="1781928" y="2060109"/>
-            <a:ext cx="1423359" cy="369332"/>
-          </a:xfrm>
-          <a:prstGeom prst="rect">
-            <a:avLst/>
-          </a:prstGeom>
-          <a:noFill/>
-        </p:spPr>
-        <p:txBody>
-          <a:bodyPr wrap="square" rtlCol="0">
-            <a:spAutoFit/>
-          </a:bodyPr>
-          <a:lstStyle/>
-          <a:p>
-            <a:r>
-              <a:rPr lang="en-US" dirty="0"/>
-              <a:t>#</a:t>
-            </a:r>
-          </a:p>
-        </p:txBody>
-      </p:sp>
-      <p:sp>
-        <p:nvSpPr>
-          <p:cNvPr id="5" name="TextBox 4">
-            <a:extLst>
-              <a:ext uri="{FF2B5EF4-FFF2-40B4-BE49-F238E27FC236}">
-                <a16:creationId xmlns:a16="http://schemas.microsoft.com/office/drawing/2014/main" id="{B2EC040B-B782-4391-B179-2DA1C08AA6E5}"/>
-              </a:ext>
-            </a:extLst>
-          </p:cNvPr>
-          <p:cNvSpPr txBox="1"/>
-          <p:nvPr/>
-        </p:nvSpPr>
-        <p:spPr>
-          <a:xfrm>
-            <a:off x="1781927" y="2650776"/>
-            <a:ext cx="1423359" cy="369332"/>
-          </a:xfrm>
-          <a:prstGeom prst="rect">
-            <a:avLst/>
-          </a:prstGeom>
-          <a:noFill/>
-        </p:spPr>
-        <p:txBody>
-          <a:bodyPr wrap="square" rtlCol="0">
-            <a:spAutoFit/>
-          </a:bodyPr>
-          <a:lstStyle/>
-          <a:p>
-            <a:r>
-              <a:rPr lang="en-US" dirty="0"/>
-              <a:t>#</a:t>
-            </a:r>
-          </a:p>
-        </p:txBody>
-      </p:sp>
-      <p:sp>
-        <p:nvSpPr>
-          <p:cNvPr id="7" name="TextBox 6">
-            <a:extLst>
-              <a:ext uri="{FF2B5EF4-FFF2-40B4-BE49-F238E27FC236}">
-                <a16:creationId xmlns:a16="http://schemas.microsoft.com/office/drawing/2014/main" id="{6A54373B-C787-4933-9DB6-F40854724190}"/>
-              </a:ext>
-            </a:extLst>
-          </p:cNvPr>
-          <p:cNvSpPr txBox="1"/>
-          <p:nvPr/>
-        </p:nvSpPr>
-        <p:spPr>
-          <a:xfrm>
-            <a:off x="1781926" y="3146314"/>
-            <a:ext cx="1423359" cy="369332"/>
-          </a:xfrm>
-          <a:prstGeom prst="rect">
-            <a:avLst/>
-          </a:prstGeom>
-          <a:noFill/>
-        </p:spPr>
-        <p:txBody>
-          <a:bodyPr wrap="square" rtlCol="0">
-            <a:spAutoFit/>
-          </a:bodyPr>
-          <a:lstStyle/>
-          <a:p>
-            <a:r>
-              <a:rPr lang="en-US" dirty="0"/>
-              <a:t>#</a:t>
-            </a:r>
-          </a:p>
-        </p:txBody>
-      </p:sp>
-      <p:sp>
-        <p:nvSpPr>
-          <p:cNvPr id="8" name="TextBox 7">
-            <a:extLst>
-              <a:ext uri="{FF2B5EF4-FFF2-40B4-BE49-F238E27FC236}">
-                <a16:creationId xmlns:a16="http://schemas.microsoft.com/office/drawing/2014/main" id="{F8917A5B-93CF-440A-A043-6B49D1C09F6F}"/>
-              </a:ext>
-            </a:extLst>
-          </p:cNvPr>
-          <p:cNvSpPr txBox="1"/>
-          <p:nvPr/>
-        </p:nvSpPr>
-        <p:spPr>
-          <a:xfrm>
-            <a:off x="1781926" y="3641852"/>
-            <a:ext cx="1423359" cy="369332"/>
-          </a:xfrm>
-          <a:prstGeom prst="rect">
-            <a:avLst/>
-          </a:prstGeom>
-          <a:noFill/>
-        </p:spPr>
-        <p:txBody>
-          <a:bodyPr wrap="square" rtlCol="0">
-            <a:spAutoFit/>
-          </a:bodyPr>
-          <a:lstStyle/>
-          <a:p>
-            <a:r>
-              <a:rPr lang="en-US" dirty="0"/>
-              <a:t>#</a:t>
-            </a:r>
-          </a:p>
-        </p:txBody>
-      </p:sp>
       <p:sp>
         <p:nvSpPr>
           <p:cNvPr id="3" name="Rectangle 2">
@@ -3629,7 +3520,7 @@
             <a:avLst/>
           </a:prstGeom>
           <a:solidFill>
-            <a:srgbClr val="0A3F64"/>
+            <a:srgbClr val="FFFFFF"/>
           </a:solidFill>
         </p:spPr>
         <p:style>
@@ -3657,6 +3548,252 @@
           </a:p>
         </p:txBody>
       </p:sp>
+      <p:grpSp>
+        <p:nvGrpSpPr>
+          <p:cNvPr id="13" name="Group 12">
+            <a:extLst>
+              <a:ext uri="{FF2B5EF4-FFF2-40B4-BE49-F238E27FC236}">
+                <a16:creationId xmlns:a16="http://schemas.microsoft.com/office/drawing/2014/main" id="{6F7F9E19-F70C-4253-BBA8-28E779380C9F}"/>
+              </a:ext>
+            </a:extLst>
+          </p:cNvPr>
+          <p:cNvGrpSpPr/>
+          <p:nvPr/>
+        </p:nvGrpSpPr>
+        <p:grpSpPr>
+          <a:xfrm>
+            <a:off x="1284178" y="2249642"/>
+            <a:ext cx="3011869" cy="2358715"/>
+            <a:chOff x="1258052" y="1673392"/>
+            <a:chExt cx="3011869" cy="2358715"/>
+          </a:xfrm>
+        </p:grpSpPr>
+        <p:pic>
+          <p:nvPicPr>
+            <p:cNvPr id="6" name="Picture 5">
+              <a:extLst>
+                <a:ext uri="{FF2B5EF4-FFF2-40B4-BE49-F238E27FC236}">
+                  <a16:creationId xmlns:a16="http://schemas.microsoft.com/office/drawing/2014/main" id="{B60620E8-C3C4-406F-95C8-391F0306BEB4}"/>
+                </a:ext>
+              </a:extLst>
+            </p:cNvPr>
+            <p:cNvPicPr>
+              <a:picLocks noChangeAspect="1"/>
+            </p:cNvPicPr>
+            <p:nvPr/>
+          </p:nvPicPr>
+          <p:blipFill>
+            <a:blip r:embed="rId2"/>
+            <a:stretch>
+              <a:fillRect/>
+            </a:stretch>
+          </p:blipFill>
+          <p:spPr>
+            <a:xfrm rot="5400000">
+              <a:off x="281740" y="2649705"/>
+              <a:ext cx="2324100" cy="371475"/>
+            </a:xfrm>
+            <a:prstGeom prst="rect">
+              <a:avLst/>
+            </a:prstGeom>
+          </p:spPr>
+        </p:pic>
+        <p:sp>
+          <p:nvSpPr>
+            <p:cNvPr id="2" name="TextBox 1">
+              <a:extLst>
+                <a:ext uri="{FF2B5EF4-FFF2-40B4-BE49-F238E27FC236}">
+                  <a16:creationId xmlns:a16="http://schemas.microsoft.com/office/drawing/2014/main" id="{FD6CD768-71BB-4466-B2C5-C838E5B32757}"/>
+                </a:ext>
+              </a:extLst>
+            </p:cNvPr>
+            <p:cNvSpPr txBox="1"/>
+            <p:nvPr/>
+          </p:nvSpPr>
+          <p:spPr>
+            <a:xfrm>
+              <a:off x="1781928" y="1673392"/>
+              <a:ext cx="2487993" cy="369332"/>
+            </a:xfrm>
+            <a:prstGeom prst="rect">
+              <a:avLst/>
+            </a:prstGeom>
+            <a:noFill/>
+          </p:spPr>
+          <p:txBody>
+            <a:bodyPr wrap="square" rtlCol="0">
+              <a:spAutoFit/>
+            </a:bodyPr>
+            <a:lstStyle/>
+            <a:p>
+              <a:r>
+                <a:rPr lang="en-US" dirty="0" err="1"/>
+                <a:t>rgb</a:t>
+              </a:r>
+              <a:r>
+                <a:rPr lang="en-US" dirty="0"/>
+                <a:t>(10,63,100)</a:t>
+              </a:r>
+            </a:p>
+          </p:txBody>
+        </p:sp>
+        <p:sp>
+          <p:nvSpPr>
+            <p:cNvPr id="9" name="TextBox 8">
+              <a:extLst>
+                <a:ext uri="{FF2B5EF4-FFF2-40B4-BE49-F238E27FC236}">
+                  <a16:creationId xmlns:a16="http://schemas.microsoft.com/office/drawing/2014/main" id="{7A95581B-74D6-4CD2-B1AA-8272F764B9B9}"/>
+                </a:ext>
+              </a:extLst>
+            </p:cNvPr>
+            <p:cNvSpPr txBox="1"/>
+            <p:nvPr/>
+          </p:nvSpPr>
+          <p:spPr>
+            <a:xfrm>
+              <a:off x="1781927" y="2113728"/>
+              <a:ext cx="2487993" cy="369332"/>
+            </a:xfrm>
+            <a:prstGeom prst="rect">
+              <a:avLst/>
+            </a:prstGeom>
+            <a:noFill/>
+          </p:spPr>
+          <p:txBody>
+            <a:bodyPr wrap="square" rtlCol="0">
+              <a:spAutoFit/>
+            </a:bodyPr>
+            <a:lstStyle/>
+            <a:p>
+              <a:r>
+                <a:rPr lang="en-US" dirty="0" err="1"/>
+                <a:t>rgb</a:t>
+              </a:r>
+              <a:r>
+                <a:rPr lang="en-US" dirty="0"/>
+                <a:t>(12,91,152)</a:t>
+              </a:r>
+            </a:p>
+          </p:txBody>
+        </p:sp>
+        <p:sp>
+          <p:nvSpPr>
+            <p:cNvPr id="10" name="TextBox 9">
+              <a:extLst>
+                <a:ext uri="{FF2B5EF4-FFF2-40B4-BE49-F238E27FC236}">
+                  <a16:creationId xmlns:a16="http://schemas.microsoft.com/office/drawing/2014/main" id="{23555D8A-FC02-4289-B1B5-7B53F9D0EB62}"/>
+                </a:ext>
+              </a:extLst>
+            </p:cNvPr>
+            <p:cNvSpPr txBox="1"/>
+            <p:nvPr/>
+          </p:nvSpPr>
+          <p:spPr>
+            <a:xfrm>
+              <a:off x="1781927" y="2650776"/>
+              <a:ext cx="2487993" cy="369332"/>
+            </a:xfrm>
+            <a:prstGeom prst="rect">
+              <a:avLst/>
+            </a:prstGeom>
+            <a:noFill/>
+          </p:spPr>
+          <p:txBody>
+            <a:bodyPr wrap="square" rtlCol="0">
+              <a:spAutoFit/>
+            </a:bodyPr>
+            <a:lstStyle/>
+            <a:p>
+              <a:r>
+                <a:rPr lang="en-US" dirty="0" err="1"/>
+                <a:t>rgb</a:t>
+              </a:r>
+              <a:r>
+                <a:rPr lang="en-US" dirty="0"/>
+                <a:t>(19,120,189)</a:t>
+              </a:r>
+            </a:p>
+          </p:txBody>
+        </p:sp>
+        <p:sp>
+          <p:nvSpPr>
+            <p:cNvPr id="11" name="TextBox 10">
+              <a:extLst>
+                <a:ext uri="{FF2B5EF4-FFF2-40B4-BE49-F238E27FC236}">
+                  <a16:creationId xmlns:a16="http://schemas.microsoft.com/office/drawing/2014/main" id="{7E6D3160-411E-4DA8-9AE2-BD20ED7435CF}"/>
+                </a:ext>
+              </a:extLst>
+            </p:cNvPr>
+            <p:cNvSpPr txBox="1"/>
+            <p:nvPr/>
+          </p:nvSpPr>
+          <p:spPr>
+            <a:xfrm>
+              <a:off x="1781926" y="3187824"/>
+              <a:ext cx="2487993" cy="369332"/>
+            </a:xfrm>
+            <a:prstGeom prst="rect">
+              <a:avLst/>
+            </a:prstGeom>
+            <a:noFill/>
+          </p:spPr>
+          <p:txBody>
+            <a:bodyPr wrap="square" rtlCol="0">
+              <a:spAutoFit/>
+            </a:bodyPr>
+            <a:lstStyle/>
+            <a:p>
+              <a:r>
+                <a:rPr lang="en-US" dirty="0" err="1"/>
+                <a:t>rgb</a:t>
+              </a:r>
+              <a:r>
+                <a:rPr lang="en-US" dirty="0"/>
+                <a:t>(62,153,210)</a:t>
+              </a:r>
+            </a:p>
+          </p:txBody>
+        </p:sp>
+        <p:sp>
+          <p:nvSpPr>
+            <p:cNvPr id="12" name="TextBox 11">
+              <a:extLst>
+                <a:ext uri="{FF2B5EF4-FFF2-40B4-BE49-F238E27FC236}">
+                  <a16:creationId xmlns:a16="http://schemas.microsoft.com/office/drawing/2014/main" id="{996820F6-E946-43E4-9562-03F67DE07D06}"/>
+                </a:ext>
+              </a:extLst>
+            </p:cNvPr>
+            <p:cNvSpPr txBox="1"/>
+            <p:nvPr/>
+          </p:nvSpPr>
+          <p:spPr>
+            <a:xfrm>
+              <a:off x="1781925" y="3662775"/>
+              <a:ext cx="2487993" cy="369332"/>
+            </a:xfrm>
+            <a:prstGeom prst="rect">
+              <a:avLst/>
+            </a:prstGeom>
+            <a:noFill/>
+          </p:spPr>
+          <p:txBody>
+            <a:bodyPr wrap="square" rtlCol="0">
+              <a:spAutoFit/>
+            </a:bodyPr>
+            <a:lstStyle/>
+            <a:p>
+              <a:r>
+                <a:rPr lang="en-US" dirty="0" err="1"/>
+                <a:t>rgb</a:t>
+              </a:r>
+              <a:r>
+                <a:rPr lang="en-US" dirty="0"/>
+                <a:t>(128,187,228)</a:t>
+              </a:r>
+            </a:p>
+          </p:txBody>
+        </p:sp>
+      </p:grpSp>
     </p:spTree>
     <p:extLst>
       <p:ext uri="{BB962C8B-B14F-4D97-AF65-F5344CB8AC3E}">
@@ -4161,15 +4298,15 @@
 <file path=customXml/itemProps1.xml><?xml version="1.0" encoding="utf-8"?>
 <ds:datastoreItem xmlns:ds="http://schemas.openxmlformats.org/officeDocument/2006/customXml" ds:itemID="{4AD49AA8-AF87-4DBE-8563-C8FDA319A4B6}">
   <ds:schemaRefs>
-    <ds:schemaRef ds:uri="http://purl.org/dc/dcmitype/"/>
-    <ds:schemaRef ds:uri="http://schemas.microsoft.com/office/2006/metadata/properties"/>
-    <ds:schemaRef ds:uri="http://purl.org/dc/elements/1.1/"/>
     <ds:schemaRef ds:uri="http://purl.org/dc/terms/"/>
     <ds:schemaRef ds:uri="http://www.w3.org/XML/1998/namespace"/>
-    <ds:schemaRef ds:uri="b70022d4-b627-41d2-93d7-06879fa40a5c"/>
     <ds:schemaRef ds:uri="http://schemas.microsoft.com/office/2006/documentManagement/types"/>
+    <ds:schemaRef ds:uri="http://purl.org/dc/elements/1.1/"/>
     <ds:schemaRef ds:uri="http://schemas.microsoft.com/office/infopath/2007/PartnerControls"/>
     <ds:schemaRef ds:uri="http://schemas.openxmlformats.org/package/2006/metadata/core-properties"/>
+    <ds:schemaRef ds:uri="b70022d4-b627-41d2-93d7-06879fa40a5c"/>
+    <ds:schemaRef ds:uri="http://schemas.microsoft.com/office/2006/metadata/properties"/>
+    <ds:schemaRef ds:uri="http://purl.org/dc/dcmitype/"/>
   </ds:schemaRefs>
 </ds:datastoreItem>
 </file>

</xml_diff>

<commit_message>
updated fetch indicators to limit sheets read in if requested
</commit_message>
<xml_diff>
--- a/Reference/KFF_colors.pptx
+++ b/Reference/KFF_colors.pptx
@@ -115,7 +115,7 @@
 <file path=ppt/revisionInfo.xml><?xml version="1.0" encoding="utf-8"?>
 <p1510:revInfo xmlns:a="http://schemas.openxmlformats.org/drawingml/2006/main" xmlns:r="http://schemas.openxmlformats.org/officeDocument/2006/relationships" xmlns:p1510="http://schemas.microsoft.com/office/powerpoint/2015/10/main">
   <p1510:revLst>
-    <p1510:client id="{F816EC80-E11A-4F4B-91FD-A9734CAD148F}" v="1" dt="2022-03-25T22:09:16.240"/>
+    <p1510:client id="{92628E28-9570-4578-BC94-5FA380B34484}" v="3" dt="2022-05-13T14:56:42.558"/>
   </p1510:revLst>
 </p1510:revInfo>
 </file>
@@ -282,6 +282,62 @@
       </pc:sldChg>
     </pc:docChg>
   </pc:docChgLst>
+  <pc:docChgLst>
+    <pc:chgData name="Patrick Drake" userId="4695e51e-8175-410b-be41-3ae9425cc76e" providerId="ADAL" clId="{92628E28-9570-4578-BC94-5FA380B34484}"/>
+    <pc:docChg chg="modSld">
+      <pc:chgData name="Patrick Drake" userId="4695e51e-8175-410b-be41-3ae9425cc76e" providerId="ADAL" clId="{92628E28-9570-4578-BC94-5FA380B34484}" dt="2022-05-13T14:56:50.215" v="16" actId="207"/>
+      <pc:docMkLst>
+        <pc:docMk/>
+      </pc:docMkLst>
+      <pc:sldChg chg="addSp modSp mod">
+        <pc:chgData name="Patrick Drake" userId="4695e51e-8175-410b-be41-3ae9425cc76e" providerId="ADAL" clId="{92628E28-9570-4578-BC94-5FA380B34484}" dt="2022-05-13T14:56:50.215" v="16" actId="207"/>
+        <pc:sldMkLst>
+          <pc:docMk/>
+          <pc:sldMk cId="1558752139" sldId="256"/>
+        </pc:sldMkLst>
+        <pc:spChg chg="mod">
+          <ac:chgData name="Patrick Drake" userId="4695e51e-8175-410b-be41-3ae9425cc76e" providerId="ADAL" clId="{92628E28-9570-4578-BC94-5FA380B34484}" dt="2022-05-12T20:09:32.488" v="5" actId="1076"/>
+          <ac:spMkLst>
+            <pc:docMk/>
+            <pc:sldMk cId="1558752139" sldId="256"/>
+            <ac:spMk id="3" creationId="{83221935-3979-429D-8526-5329D4A216E4}"/>
+          </ac:spMkLst>
+        </pc:spChg>
+        <pc:spChg chg="add mod">
+          <ac:chgData name="Patrick Drake" userId="4695e51e-8175-410b-be41-3ae9425cc76e" providerId="ADAL" clId="{92628E28-9570-4578-BC94-5FA380B34484}" dt="2022-05-12T20:10:35.367" v="10" actId="1076"/>
+          <ac:spMkLst>
+            <pc:docMk/>
+            <pc:sldMk cId="1558752139" sldId="256"/>
+            <ac:spMk id="14" creationId="{242B552D-AB33-4195-9093-3A8B7A3AA4CA}"/>
+          </ac:spMkLst>
+        </pc:spChg>
+        <pc:spChg chg="add mod">
+          <ac:chgData name="Patrick Drake" userId="4695e51e-8175-410b-be41-3ae9425cc76e" providerId="ADAL" clId="{92628E28-9570-4578-BC94-5FA380B34484}" dt="2022-05-13T14:43:03.043" v="13" actId="207"/>
+          <ac:spMkLst>
+            <pc:docMk/>
+            <pc:sldMk cId="1558752139" sldId="256"/>
+            <ac:spMk id="15" creationId="{11D4927C-20A5-49D0-90C8-A7186DB6B4FA}"/>
+          </ac:spMkLst>
+        </pc:spChg>
+        <pc:spChg chg="add mod">
+          <ac:chgData name="Patrick Drake" userId="4695e51e-8175-410b-be41-3ae9425cc76e" providerId="ADAL" clId="{92628E28-9570-4578-BC94-5FA380B34484}" dt="2022-05-13T14:56:50.215" v="16" actId="207"/>
+          <ac:spMkLst>
+            <pc:docMk/>
+            <pc:sldMk cId="1558752139" sldId="256"/>
+            <ac:spMk id="16" creationId="{046AEDE7-5158-4746-949A-5674B6C0B64F}"/>
+          </ac:spMkLst>
+        </pc:spChg>
+        <pc:picChg chg="add mod">
+          <ac:chgData name="Patrick Drake" userId="4695e51e-8175-410b-be41-3ae9425cc76e" providerId="ADAL" clId="{92628E28-9570-4578-BC94-5FA380B34484}" dt="2022-05-11T17:16:02.321" v="1" actId="1076"/>
+          <ac:picMkLst>
+            <pc:docMk/>
+            <pc:sldMk cId="1558752139" sldId="256"/>
+            <ac:picMk id="5" creationId="{347D0DB9-BE31-4C75-8BC5-5B6D73D542B1}"/>
+          </ac:picMkLst>
+        </pc:picChg>
+      </pc:sldChg>
+    </pc:docChg>
+  </pc:docChgLst>
 </pc:chgInfo>
 </file>
 
@@ -432,7 +488,7 @@
           <a:p>
             <a:fld id="{46D519C6-55E0-49FB-B8BB-91DA255A62EC}" type="datetimeFigureOut">
               <a:rPr lang="en-US" smtClean="0"/>
-              <a:t>3/25/2022</a:t>
+              <a:t>5/11/2022</a:t>
             </a:fld>
             <a:endParaRPr lang="en-US"/>
           </a:p>
@@ -630,7 +686,7 @@
           <a:p>
             <a:fld id="{46D519C6-55E0-49FB-B8BB-91DA255A62EC}" type="datetimeFigureOut">
               <a:rPr lang="en-US" smtClean="0"/>
-              <a:t>3/25/2022</a:t>
+              <a:t>5/11/2022</a:t>
             </a:fld>
             <a:endParaRPr lang="en-US"/>
           </a:p>
@@ -838,7 +894,7 @@
           <a:p>
             <a:fld id="{46D519C6-55E0-49FB-B8BB-91DA255A62EC}" type="datetimeFigureOut">
               <a:rPr lang="en-US" smtClean="0"/>
-              <a:t>3/25/2022</a:t>
+              <a:t>5/11/2022</a:t>
             </a:fld>
             <a:endParaRPr lang="en-US"/>
           </a:p>
@@ -1036,7 +1092,7 @@
           <a:p>
             <a:fld id="{46D519C6-55E0-49FB-B8BB-91DA255A62EC}" type="datetimeFigureOut">
               <a:rPr lang="en-US" smtClean="0"/>
-              <a:t>3/25/2022</a:t>
+              <a:t>5/11/2022</a:t>
             </a:fld>
             <a:endParaRPr lang="en-US"/>
           </a:p>
@@ -1311,7 +1367,7 @@
           <a:p>
             <a:fld id="{46D519C6-55E0-49FB-B8BB-91DA255A62EC}" type="datetimeFigureOut">
               <a:rPr lang="en-US" smtClean="0"/>
-              <a:t>3/25/2022</a:t>
+              <a:t>5/11/2022</a:t>
             </a:fld>
             <a:endParaRPr lang="en-US"/>
           </a:p>
@@ -1576,7 +1632,7 @@
           <a:p>
             <a:fld id="{46D519C6-55E0-49FB-B8BB-91DA255A62EC}" type="datetimeFigureOut">
               <a:rPr lang="en-US" smtClean="0"/>
-              <a:t>3/25/2022</a:t>
+              <a:t>5/11/2022</a:t>
             </a:fld>
             <a:endParaRPr lang="en-US"/>
           </a:p>
@@ -1988,7 +2044,7 @@
           <a:p>
             <a:fld id="{46D519C6-55E0-49FB-B8BB-91DA255A62EC}" type="datetimeFigureOut">
               <a:rPr lang="en-US" smtClean="0"/>
-              <a:t>3/25/2022</a:t>
+              <a:t>5/11/2022</a:t>
             </a:fld>
             <a:endParaRPr lang="en-US"/>
           </a:p>
@@ -2129,7 +2185,7 @@
           <a:p>
             <a:fld id="{46D519C6-55E0-49FB-B8BB-91DA255A62EC}" type="datetimeFigureOut">
               <a:rPr lang="en-US" smtClean="0"/>
-              <a:t>3/25/2022</a:t>
+              <a:t>5/11/2022</a:t>
             </a:fld>
             <a:endParaRPr lang="en-US"/>
           </a:p>
@@ -2242,7 +2298,7 @@
           <a:p>
             <a:fld id="{46D519C6-55E0-49FB-B8BB-91DA255A62EC}" type="datetimeFigureOut">
               <a:rPr lang="en-US" smtClean="0"/>
-              <a:t>3/25/2022</a:t>
+              <a:t>5/11/2022</a:t>
             </a:fld>
             <a:endParaRPr lang="en-US"/>
           </a:p>
@@ -2553,7 +2609,7 @@
           <a:p>
             <a:fld id="{46D519C6-55E0-49FB-B8BB-91DA255A62EC}" type="datetimeFigureOut">
               <a:rPr lang="en-US" smtClean="0"/>
-              <a:t>3/25/2022</a:t>
+              <a:t>5/11/2022</a:t>
             </a:fld>
             <a:endParaRPr lang="en-US"/>
           </a:p>
@@ -2841,7 +2897,7 @@
           <a:p>
             <a:fld id="{46D519C6-55E0-49FB-B8BB-91DA255A62EC}" type="datetimeFigureOut">
               <a:rPr lang="en-US" smtClean="0"/>
-              <a:t>3/25/2022</a:t>
+              <a:t>5/11/2022</a:t>
             </a:fld>
             <a:endParaRPr lang="en-US"/>
           </a:p>
@@ -3082,7 +3138,7 @@
           <a:p>
             <a:fld id="{46D519C6-55E0-49FB-B8BB-91DA255A62EC}" type="datetimeFigureOut">
               <a:rPr lang="en-US" smtClean="0"/>
-              <a:t>3/25/2022</a:t>
+              <a:t>5/11/2022</a:t>
             </a:fld>
             <a:endParaRPr lang="en-US"/>
           </a:p>
@@ -3513,14 +3569,14 @@
         </p:nvSpPr>
         <p:spPr>
           <a:xfrm>
-            <a:off x="5124091" y="1328468"/>
+            <a:off x="5663096" y="5085395"/>
             <a:ext cx="1725283" cy="1233577"/>
           </a:xfrm>
           <a:prstGeom prst="rect">
             <a:avLst/>
           </a:prstGeom>
           <a:solidFill>
-            <a:srgbClr val="FFFFFF"/>
+            <a:srgbClr val="F5821F"/>
           </a:solidFill>
         </p:spPr>
         <p:style>
@@ -3794,6 +3850,183 @@
           </p:txBody>
         </p:sp>
       </p:grpSp>
+      <p:pic>
+        <p:nvPicPr>
+          <p:cNvPr id="5" name="Picture 4">
+            <a:extLst>
+              <a:ext uri="{FF2B5EF4-FFF2-40B4-BE49-F238E27FC236}">
+                <a16:creationId xmlns:a16="http://schemas.microsoft.com/office/drawing/2014/main" id="{347D0DB9-BE31-4C75-8BC5-5B6D73D542B1}"/>
+              </a:ext>
+            </a:extLst>
+          </p:cNvPr>
+          <p:cNvPicPr>
+            <a:picLocks noChangeAspect="1"/>
+          </p:cNvPicPr>
+          <p:nvPr/>
+        </p:nvPicPr>
+        <p:blipFill>
+          <a:blip r:embed="rId3"/>
+          <a:stretch>
+            <a:fillRect/>
+          </a:stretch>
+        </p:blipFill>
+        <p:spPr>
+          <a:xfrm>
+            <a:off x="1331804" y="5216409"/>
+            <a:ext cx="647700" cy="485775"/>
+          </a:xfrm>
+          <a:prstGeom prst="rect">
+            <a:avLst/>
+          </a:prstGeom>
+        </p:spPr>
+      </p:pic>
+      <p:sp>
+        <p:nvSpPr>
+          <p:cNvPr id="14" name="Rectangle 13">
+            <a:extLst>
+              <a:ext uri="{FF2B5EF4-FFF2-40B4-BE49-F238E27FC236}">
+                <a16:creationId xmlns:a16="http://schemas.microsoft.com/office/drawing/2014/main" id="{242B552D-AB33-4195-9093-3A8B7A3AA4CA}"/>
+              </a:ext>
+            </a:extLst>
+          </p:cNvPr>
+          <p:cNvSpPr/>
+          <p:nvPr/>
+        </p:nvSpPr>
+        <p:spPr>
+          <a:xfrm>
+            <a:off x="5100601" y="3244334"/>
+            <a:ext cx="1725283" cy="369332"/>
+          </a:xfrm>
+          <a:prstGeom prst="rect">
+            <a:avLst/>
+          </a:prstGeom>
+          <a:solidFill>
+            <a:srgbClr val="3E99D3"/>
+          </a:solidFill>
+        </p:spPr>
+        <p:style>
+          <a:lnRef idx="2">
+            <a:schemeClr val="accent1">
+              <a:shade val="50000"/>
+            </a:schemeClr>
+          </a:lnRef>
+          <a:fillRef idx="1">
+            <a:schemeClr val="accent1"/>
+          </a:fillRef>
+          <a:effectRef idx="0">
+            <a:schemeClr val="accent1"/>
+          </a:effectRef>
+          <a:fontRef idx="minor">
+            <a:schemeClr val="lt1"/>
+          </a:fontRef>
+        </p:style>
+        <p:txBody>
+          <a:bodyPr rtlCol="0" anchor="ctr"/>
+          <a:lstStyle/>
+          <a:p>
+            <a:pPr algn="ctr"/>
+            <a:endParaRPr lang="en-US"/>
+          </a:p>
+        </p:txBody>
+      </p:sp>
+      <p:sp>
+        <p:nvSpPr>
+          <p:cNvPr id="15" name="Rectangle 14">
+            <a:extLst>
+              <a:ext uri="{FF2B5EF4-FFF2-40B4-BE49-F238E27FC236}">
+                <a16:creationId xmlns:a16="http://schemas.microsoft.com/office/drawing/2014/main" id="{11D4927C-20A5-49D0-90C8-A7186DB6B4FA}"/>
+              </a:ext>
+            </a:extLst>
+          </p:cNvPr>
+          <p:cNvSpPr/>
+          <p:nvPr/>
+        </p:nvSpPr>
+        <p:spPr>
+          <a:xfrm>
+            <a:off x="4800454" y="2249642"/>
+            <a:ext cx="1725283" cy="369332"/>
+          </a:xfrm>
+          <a:prstGeom prst="rect">
+            <a:avLst/>
+          </a:prstGeom>
+          <a:solidFill>
+            <a:srgbClr val="0A3F64"/>
+          </a:solidFill>
+        </p:spPr>
+        <p:style>
+          <a:lnRef idx="2">
+            <a:schemeClr val="accent1">
+              <a:shade val="50000"/>
+            </a:schemeClr>
+          </a:lnRef>
+          <a:fillRef idx="1">
+            <a:schemeClr val="accent1"/>
+          </a:fillRef>
+          <a:effectRef idx="0">
+            <a:schemeClr val="accent1"/>
+          </a:effectRef>
+          <a:fontRef idx="minor">
+            <a:schemeClr val="lt1"/>
+          </a:fontRef>
+        </p:style>
+        <p:txBody>
+          <a:bodyPr rtlCol="0" anchor="ctr"/>
+          <a:lstStyle/>
+          <a:p>
+            <a:pPr algn="ctr"/>
+            <a:endParaRPr lang="en-US"/>
+          </a:p>
+        </p:txBody>
+      </p:sp>
+      <p:sp>
+        <p:nvSpPr>
+          <p:cNvPr id="16" name="Rectangle 15">
+            <a:extLst>
+              <a:ext uri="{FF2B5EF4-FFF2-40B4-BE49-F238E27FC236}">
+                <a16:creationId xmlns:a16="http://schemas.microsoft.com/office/drawing/2014/main" id="{046AEDE7-5158-4746-949A-5674B6C0B64F}"/>
+              </a:ext>
+            </a:extLst>
+          </p:cNvPr>
+          <p:cNvSpPr/>
+          <p:nvPr/>
+        </p:nvSpPr>
+        <p:spPr>
+          <a:xfrm>
+            <a:off x="5095059" y="4252598"/>
+            <a:ext cx="1725283" cy="369332"/>
+          </a:xfrm>
+          <a:prstGeom prst="rect">
+            <a:avLst/>
+          </a:prstGeom>
+          <a:solidFill>
+            <a:srgbClr val="80BBE4"/>
+          </a:solidFill>
+        </p:spPr>
+        <p:style>
+          <a:lnRef idx="2">
+            <a:schemeClr val="accent1">
+              <a:shade val="50000"/>
+            </a:schemeClr>
+          </a:lnRef>
+          <a:fillRef idx="1">
+            <a:schemeClr val="accent1"/>
+          </a:fillRef>
+          <a:effectRef idx="0">
+            <a:schemeClr val="accent1"/>
+          </a:effectRef>
+          <a:fontRef idx="minor">
+            <a:schemeClr val="lt1"/>
+          </a:fontRef>
+        </p:style>
+        <p:txBody>
+          <a:bodyPr rtlCol="0" anchor="ctr"/>
+          <a:lstStyle/>
+          <a:p>
+            <a:pPr algn="ctr"/>
+            <a:endParaRPr lang="en-US"/>
+          </a:p>
+        </p:txBody>
+      </p:sp>
     </p:spTree>
     <p:extLst>
       <p:ext uri="{BB962C8B-B14F-4D97-AF65-F5344CB8AC3E}">
@@ -4103,21 +4336,6 @@
 </file>
 
 <file path=customXml/item1.xml><?xml version="1.0" encoding="utf-8"?>
-<p:properties xmlns:p="http://schemas.microsoft.com/office/2006/metadata/properties" xmlns:xsi="http://www.w3.org/2001/XMLSchema-instance" xmlns:pc="http://schemas.microsoft.com/office/infopath/2007/PartnerControls">
-  <documentManagement/>
-</p:properties>
-</file>
-
-<file path=customXml/item2.xml><?xml version="1.0" encoding="utf-8"?>
-<?mso-contentType ?>
-<FormTemplates xmlns="http://schemas.microsoft.com/sharepoint/v3/contenttype/forms">
-  <Display>DocumentLibraryForm</Display>
-  <Edit>DocumentLibraryForm</Edit>
-  <New>DocumentLibraryForm</New>
-</FormTemplates>
-</file>
-
-<file path=customXml/item3.xml><?xml version="1.0" encoding="utf-8"?>
 <ct:contentTypeSchema xmlns:ct="http://schemas.microsoft.com/office/2006/metadata/contentType" xmlns:ma="http://schemas.microsoft.com/office/2006/metadata/properties/metaAttributes" ct:_="" ma:_="" ma:contentTypeName="Document" ma:contentTypeID="0x01010052A6434F26842448907201F2CC0598BC" ma:contentTypeVersion="9" ma:contentTypeDescription="Create a new document." ma:contentTypeScope="" ma:versionID="e0a98e712fb6bc54844f145ec65c9d0a">
   <xsd:schema xmlns:xsd="http://www.w3.org/2001/XMLSchema" xmlns:xs="http://www.w3.org/2001/XMLSchema" xmlns:p="http://schemas.microsoft.com/office/2006/metadata/properties" xmlns:ns3="b70022d4-b627-41d2-93d7-06879fa40a5c" targetNamespace="http://schemas.microsoft.com/office/2006/metadata/properties" ma:root="true" ma:fieldsID="ac44a2bb8beb725fd7f70345fc3c3daa" ns3:_="">
     <xsd:import namespace="b70022d4-b627-41d2-93d7-06879fa40a5c"/>
@@ -4295,31 +4513,22 @@
 </ct:contentTypeSchema>
 </file>
 
-<file path=customXml/itemProps1.xml><?xml version="1.0" encoding="utf-8"?>
-<ds:datastoreItem xmlns:ds="http://schemas.openxmlformats.org/officeDocument/2006/customXml" ds:itemID="{4AD49AA8-AF87-4DBE-8563-C8FDA319A4B6}">
-  <ds:schemaRefs>
-    <ds:schemaRef ds:uri="http://purl.org/dc/terms/"/>
-    <ds:schemaRef ds:uri="http://www.w3.org/XML/1998/namespace"/>
-    <ds:schemaRef ds:uri="http://schemas.microsoft.com/office/2006/documentManagement/types"/>
-    <ds:schemaRef ds:uri="http://purl.org/dc/elements/1.1/"/>
-    <ds:schemaRef ds:uri="http://schemas.microsoft.com/office/infopath/2007/PartnerControls"/>
-    <ds:schemaRef ds:uri="http://schemas.openxmlformats.org/package/2006/metadata/core-properties"/>
-    <ds:schemaRef ds:uri="b70022d4-b627-41d2-93d7-06879fa40a5c"/>
-    <ds:schemaRef ds:uri="http://schemas.microsoft.com/office/2006/metadata/properties"/>
-    <ds:schemaRef ds:uri="http://purl.org/dc/dcmitype/"/>
-  </ds:schemaRefs>
-</ds:datastoreItem>
+<file path=customXml/item2.xml><?xml version="1.0" encoding="utf-8"?>
+<?mso-contentType ?>
+<FormTemplates xmlns="http://schemas.microsoft.com/sharepoint/v3/contenttype/forms">
+  <Display>DocumentLibraryForm</Display>
+  <Edit>DocumentLibraryForm</Edit>
+  <New>DocumentLibraryForm</New>
+</FormTemplates>
 </file>
 
-<file path=customXml/itemProps2.xml><?xml version="1.0" encoding="utf-8"?>
-<ds:datastoreItem xmlns:ds="http://schemas.openxmlformats.org/officeDocument/2006/customXml" ds:itemID="{8E111DF0-85D9-4A90-9FB8-D91B97C3C21F}">
-  <ds:schemaRefs>
-    <ds:schemaRef ds:uri="http://schemas.microsoft.com/sharepoint/v3/contenttype/forms"/>
-  </ds:schemaRefs>
-</ds:datastoreItem>
+<file path=customXml/item3.xml><?xml version="1.0" encoding="utf-8"?>
+<p:properties xmlns:p="http://schemas.microsoft.com/office/2006/metadata/properties" xmlns:xsi="http://www.w3.org/2001/XMLSchema-instance" xmlns:pc="http://schemas.microsoft.com/office/infopath/2007/PartnerControls">
+  <documentManagement/>
+</p:properties>
 </file>
 
-<file path=customXml/itemProps3.xml><?xml version="1.0" encoding="utf-8"?>
+<file path=customXml/itemProps1.xml><?xml version="1.0" encoding="utf-8"?>
 <ds:datastoreItem xmlns:ds="http://schemas.openxmlformats.org/officeDocument/2006/customXml" ds:itemID="{B486D7E4-E3BD-4FC5-85A9-857C1D60B712}">
   <ds:schemaRefs>
     <ds:schemaRef ds:uri="http://schemas.microsoft.com/office/2006/metadata/contentType"/>
@@ -4335,4 +4544,28 @@
     <ds:schemaRef ds:uri="http://schemas.microsoft.com/internal/obd"/>
   </ds:schemaRefs>
 </ds:datastoreItem>
+</file>
+
+<file path=customXml/itemProps2.xml><?xml version="1.0" encoding="utf-8"?>
+<ds:datastoreItem xmlns:ds="http://schemas.openxmlformats.org/officeDocument/2006/customXml" ds:itemID="{8E111DF0-85D9-4A90-9FB8-D91B97C3C21F}">
+  <ds:schemaRefs>
+    <ds:schemaRef ds:uri="http://schemas.microsoft.com/sharepoint/v3/contenttype/forms"/>
+  </ds:schemaRefs>
+</ds:datastoreItem>
+</file>
+
+<file path=customXml/itemProps3.xml><?xml version="1.0" encoding="utf-8"?>
+<ds:datastoreItem xmlns:ds="http://schemas.openxmlformats.org/officeDocument/2006/customXml" ds:itemID="{4AD49AA8-AF87-4DBE-8563-C8FDA319A4B6}">
+  <ds:schemaRefs>
+    <ds:schemaRef ds:uri="http://purl.org/dc/terms/"/>
+    <ds:schemaRef ds:uri="http://www.w3.org/XML/1998/namespace"/>
+    <ds:schemaRef ds:uri="http://schemas.microsoft.com/office/2006/documentManagement/types"/>
+    <ds:schemaRef ds:uri="http://purl.org/dc/elements/1.1/"/>
+    <ds:schemaRef ds:uri="http://schemas.microsoft.com/office/infopath/2007/PartnerControls"/>
+    <ds:schemaRef ds:uri="http://schemas.openxmlformats.org/package/2006/metadata/core-properties"/>
+    <ds:schemaRef ds:uri="b70022d4-b627-41d2-93d7-06879fa40a5c"/>
+    <ds:schemaRef ds:uri="http://schemas.microsoft.com/office/2006/metadata/properties"/>
+    <ds:schemaRef ds:uri="http://purl.org/dc/dcmitype/"/>
+  </ds:schemaRefs>
+</ds:datastoreItem>
 </file>
</xml_diff>

<commit_message>
adding funciton to pull specific sheet to fetchIndicator
</commit_message>
<xml_diff>
--- a/Reference/KFF_colors.pptx
+++ b/Reference/KFF_colors.pptx
@@ -284,17 +284,25 @@
   </pc:docChgLst>
   <pc:docChgLst>
     <pc:chgData name="Patrick Drake" userId="4695e51e-8175-410b-be41-3ae9425cc76e" providerId="ADAL" clId="{769BE024-F92F-493B-B821-B1875758E33A}"/>
-    <pc:docChg chg="custSel modSld">
-      <pc:chgData name="Patrick Drake" userId="4695e51e-8175-410b-be41-3ae9425cc76e" providerId="ADAL" clId="{769BE024-F92F-493B-B821-B1875758E33A}" dt="2022-11-03T15:27:57.950" v="31" actId="1076"/>
+    <pc:docChg chg="undo custSel modSld">
+      <pc:chgData name="Patrick Drake" userId="4695e51e-8175-410b-be41-3ae9425cc76e" providerId="ADAL" clId="{769BE024-F92F-493B-B821-B1875758E33A}" dt="2022-11-03T16:44:06.707" v="43"/>
       <pc:docMkLst>
         <pc:docMk/>
       </pc:docMkLst>
       <pc:sldChg chg="addSp delSp modSp mod">
-        <pc:chgData name="Patrick Drake" userId="4695e51e-8175-410b-be41-3ae9425cc76e" providerId="ADAL" clId="{769BE024-F92F-493B-B821-B1875758E33A}" dt="2022-11-03T15:27:57.950" v="31" actId="1076"/>
+        <pc:chgData name="Patrick Drake" userId="4695e51e-8175-410b-be41-3ae9425cc76e" providerId="ADAL" clId="{769BE024-F92F-493B-B821-B1875758E33A}" dt="2022-11-03T16:44:06.707" v="43"/>
         <pc:sldMkLst>
           <pc:docMk/>
           <pc:sldMk cId="1558752139" sldId="256"/>
         </pc:sldMkLst>
+        <pc:spChg chg="mod">
+          <ac:chgData name="Patrick Drake" userId="4695e51e-8175-410b-be41-3ae9425cc76e" providerId="ADAL" clId="{769BE024-F92F-493B-B821-B1875758E33A}" dt="2022-11-03T16:43:52.094" v="40"/>
+          <ac:spMkLst>
+            <pc:docMk/>
+            <pc:sldMk cId="1558752139" sldId="256"/>
+            <ac:spMk id="2" creationId="{FD6CD768-71BB-4466-B2C5-C838E5B32757}"/>
+          </ac:spMkLst>
+        </pc:spChg>
         <pc:spChg chg="mod">
           <ac:chgData name="Patrick Drake" userId="4695e51e-8175-410b-be41-3ae9425cc76e" providerId="ADAL" clId="{769BE024-F92F-493B-B821-B1875758E33A}" dt="2022-11-03T15:24:26.768" v="2" actId="1076"/>
           <ac:spMkLst>
@@ -304,11 +312,43 @@
           </ac:spMkLst>
         </pc:spChg>
         <pc:spChg chg="add mod">
-          <ac:chgData name="Patrick Drake" userId="4695e51e-8175-410b-be41-3ae9425cc76e" providerId="ADAL" clId="{769BE024-F92F-493B-B821-B1875758E33A}" dt="2022-11-03T15:27:56.438" v="30" actId="1076"/>
+          <ac:chgData name="Patrick Drake" userId="4695e51e-8175-410b-be41-3ae9425cc76e" providerId="ADAL" clId="{769BE024-F92F-493B-B821-B1875758E33A}" dt="2022-11-03T16:21:30.954" v="33" actId="1076"/>
           <ac:spMkLst>
             <pc:docMk/>
             <pc:sldMk cId="1558752139" sldId="256"/>
             <ac:spMk id="8" creationId="{09C33E0A-6973-49AD-A31F-2F8FA40AFCBE}"/>
+          </ac:spMkLst>
+        </pc:spChg>
+        <pc:spChg chg="mod">
+          <ac:chgData name="Patrick Drake" userId="4695e51e-8175-410b-be41-3ae9425cc76e" providerId="ADAL" clId="{769BE024-F92F-493B-B821-B1875758E33A}" dt="2022-11-03T16:44:06.707" v="43"/>
+          <ac:spMkLst>
+            <pc:docMk/>
+            <pc:sldMk cId="1558752139" sldId="256"/>
+            <ac:spMk id="9" creationId="{7A95581B-74D6-4CD2-B1AA-8272F764B9B9}"/>
+          </ac:spMkLst>
+        </pc:spChg>
+        <pc:spChg chg="mod">
+          <ac:chgData name="Patrick Drake" userId="4695e51e-8175-410b-be41-3ae9425cc76e" providerId="ADAL" clId="{769BE024-F92F-493B-B821-B1875758E33A}" dt="2022-11-03T16:43:09.537" v="38"/>
+          <ac:spMkLst>
+            <pc:docMk/>
+            <pc:sldMk cId="1558752139" sldId="256"/>
+            <ac:spMk id="10" creationId="{23555D8A-FC02-4289-B1B5-7B53F9D0EB62}"/>
+          </ac:spMkLst>
+        </pc:spChg>
+        <pc:spChg chg="mod">
+          <ac:chgData name="Patrick Drake" userId="4695e51e-8175-410b-be41-3ae9425cc76e" providerId="ADAL" clId="{769BE024-F92F-493B-B821-B1875758E33A}" dt="2022-11-03T16:43:58.669" v="41" actId="207"/>
+          <ac:spMkLst>
+            <pc:docMk/>
+            <pc:sldMk cId="1558752139" sldId="256"/>
+            <ac:spMk id="14" creationId="{242B552D-AB33-4195-9093-3A8B7A3AA4CA}"/>
+          </ac:spMkLst>
+        </pc:spChg>
+        <pc:spChg chg="mod">
+          <ac:chgData name="Patrick Drake" userId="4695e51e-8175-410b-be41-3ae9425cc76e" providerId="ADAL" clId="{769BE024-F92F-493B-B821-B1875758E33A}" dt="2022-11-03T16:21:54.768" v="34" actId="207"/>
+          <ac:spMkLst>
+            <pc:docMk/>
+            <pc:sldMk cId="1558752139" sldId="256"/>
+            <ac:spMk id="15" creationId="{11D4927C-20A5-49D0-90C8-A7186DB6B4FA}"/>
           </ac:spMkLst>
         </pc:spChg>
         <pc:spChg chg="add mod">
@@ -3776,7 +3816,7 @@
               </a:r>
               <a:r>
                 <a:rPr lang="en-US" dirty="0"/>
-                <a:t>(10,63,100)</a:t>
+                <a:t>(10,63,100) #0A3F64</a:t>
               </a:r>
             </a:p>
           </p:txBody>
@@ -3815,7 +3855,7 @@
               </a:r>
               <a:r>
                 <a:rPr lang="en-US" dirty="0"/>
-                <a:t>(12,91,152)</a:t>
+                <a:t>(12,91,152) #0C5B98</a:t>
               </a:r>
             </a:p>
           </p:txBody>
@@ -3835,7 +3875,7 @@
           <p:spPr>
             <a:xfrm>
               <a:off x="1781927" y="2650776"/>
-              <a:ext cx="2487993" cy="369332"/>
+              <a:ext cx="2487993" cy="646331"/>
             </a:xfrm>
             <a:prstGeom prst="rect">
               <a:avLst/>
@@ -3854,7 +3894,7 @@
               </a:r>
               <a:r>
                 <a:rPr lang="en-US" dirty="0"/>
-                <a:t>(19,120,189)</a:t>
+                <a:t>(19,120,189) #1378BD</a:t>
               </a:r>
             </a:p>
           </p:txBody>
@@ -3989,7 +4029,7 @@
             <a:avLst/>
           </a:prstGeom>
           <a:solidFill>
-            <a:srgbClr val="3E99D3"/>
+            <a:srgbClr val="0C5B98"/>
           </a:solidFill>
         </p:spPr>
         <p:style>
@@ -4671,21 +4711,6 @@
 </file>
 
 <file path=customXml/item1.xml><?xml version="1.0" encoding="utf-8"?>
-<p:properties xmlns:p="http://schemas.microsoft.com/office/2006/metadata/properties" xmlns:xsi="http://www.w3.org/2001/XMLSchema-instance" xmlns:pc="http://schemas.microsoft.com/office/infopath/2007/PartnerControls">
-  <documentManagement/>
-</p:properties>
-</file>
-
-<file path=customXml/item2.xml><?xml version="1.0" encoding="utf-8"?>
-<?mso-contentType ?>
-<FormTemplates xmlns="http://schemas.microsoft.com/sharepoint/v3/contenttype/forms">
-  <Display>DocumentLibraryForm</Display>
-  <Edit>DocumentLibraryForm</Edit>
-  <New>DocumentLibraryForm</New>
-</FormTemplates>
-</file>
-
-<file path=customXml/item3.xml><?xml version="1.0" encoding="utf-8"?>
 <ct:contentTypeSchema xmlns:ct="http://schemas.microsoft.com/office/2006/metadata/contentType" xmlns:ma="http://schemas.microsoft.com/office/2006/metadata/properties/metaAttributes" ct:_="" ma:_="" ma:contentTypeName="Document" ma:contentTypeID="0x01010052A6434F26842448907201F2CC0598BC" ma:contentTypeVersion="9" ma:contentTypeDescription="Create a new document." ma:contentTypeScope="" ma:versionID="e0a98e712fb6bc54844f145ec65c9d0a">
   <xsd:schema xmlns:xsd="http://www.w3.org/2001/XMLSchema" xmlns:xs="http://www.w3.org/2001/XMLSchema" xmlns:p="http://schemas.microsoft.com/office/2006/metadata/properties" xmlns:ns3="b70022d4-b627-41d2-93d7-06879fa40a5c" targetNamespace="http://schemas.microsoft.com/office/2006/metadata/properties" ma:root="true" ma:fieldsID="ac44a2bb8beb725fd7f70345fc3c3daa" ns3:_="">
     <xsd:import namespace="b70022d4-b627-41d2-93d7-06879fa40a5c"/>
@@ -4863,31 +4888,22 @@
 </ct:contentTypeSchema>
 </file>
 
-<file path=customXml/itemProps1.xml><?xml version="1.0" encoding="utf-8"?>
-<ds:datastoreItem xmlns:ds="http://schemas.openxmlformats.org/officeDocument/2006/customXml" ds:itemID="{4AD49AA8-AF87-4DBE-8563-C8FDA319A4B6}">
-  <ds:schemaRefs>
-    <ds:schemaRef ds:uri="http://purl.org/dc/terms/"/>
-    <ds:schemaRef ds:uri="http://www.w3.org/XML/1998/namespace"/>
-    <ds:schemaRef ds:uri="http://schemas.microsoft.com/office/2006/documentManagement/types"/>
-    <ds:schemaRef ds:uri="http://purl.org/dc/elements/1.1/"/>
-    <ds:schemaRef ds:uri="http://schemas.microsoft.com/office/infopath/2007/PartnerControls"/>
-    <ds:schemaRef ds:uri="http://schemas.openxmlformats.org/package/2006/metadata/core-properties"/>
-    <ds:schemaRef ds:uri="b70022d4-b627-41d2-93d7-06879fa40a5c"/>
-    <ds:schemaRef ds:uri="http://schemas.microsoft.com/office/2006/metadata/properties"/>
-    <ds:schemaRef ds:uri="http://purl.org/dc/dcmitype/"/>
-  </ds:schemaRefs>
-</ds:datastoreItem>
+<file path=customXml/item2.xml><?xml version="1.0" encoding="utf-8"?>
+<?mso-contentType ?>
+<FormTemplates xmlns="http://schemas.microsoft.com/sharepoint/v3/contenttype/forms">
+  <Display>DocumentLibraryForm</Display>
+  <Edit>DocumentLibraryForm</Edit>
+  <New>DocumentLibraryForm</New>
+</FormTemplates>
 </file>
 
-<file path=customXml/itemProps2.xml><?xml version="1.0" encoding="utf-8"?>
-<ds:datastoreItem xmlns:ds="http://schemas.openxmlformats.org/officeDocument/2006/customXml" ds:itemID="{8E111DF0-85D9-4A90-9FB8-D91B97C3C21F}">
-  <ds:schemaRefs>
-    <ds:schemaRef ds:uri="http://schemas.microsoft.com/sharepoint/v3/contenttype/forms"/>
-  </ds:schemaRefs>
-</ds:datastoreItem>
+<file path=customXml/item3.xml><?xml version="1.0" encoding="utf-8"?>
+<p:properties xmlns:p="http://schemas.microsoft.com/office/2006/metadata/properties" xmlns:xsi="http://www.w3.org/2001/XMLSchema-instance" xmlns:pc="http://schemas.microsoft.com/office/infopath/2007/PartnerControls">
+  <documentManagement/>
+</p:properties>
 </file>
 
-<file path=customXml/itemProps3.xml><?xml version="1.0" encoding="utf-8"?>
+<file path=customXml/itemProps1.xml><?xml version="1.0" encoding="utf-8"?>
 <ds:datastoreItem xmlns:ds="http://schemas.openxmlformats.org/officeDocument/2006/customXml" ds:itemID="{B486D7E4-E3BD-4FC5-85A9-857C1D60B712}">
   <ds:schemaRefs>
     <ds:schemaRef ds:uri="http://schemas.microsoft.com/office/2006/metadata/contentType"/>
@@ -4903,4 +4919,28 @@
     <ds:schemaRef ds:uri="http://schemas.microsoft.com/internal/obd"/>
   </ds:schemaRefs>
 </ds:datastoreItem>
+</file>
+
+<file path=customXml/itemProps2.xml><?xml version="1.0" encoding="utf-8"?>
+<ds:datastoreItem xmlns:ds="http://schemas.openxmlformats.org/officeDocument/2006/customXml" ds:itemID="{8E111DF0-85D9-4A90-9FB8-D91B97C3C21F}">
+  <ds:schemaRefs>
+    <ds:schemaRef ds:uri="http://schemas.microsoft.com/sharepoint/v3/contenttype/forms"/>
+  </ds:schemaRefs>
+</ds:datastoreItem>
+</file>
+
+<file path=customXml/itemProps3.xml><?xml version="1.0" encoding="utf-8"?>
+<ds:datastoreItem xmlns:ds="http://schemas.openxmlformats.org/officeDocument/2006/customXml" ds:itemID="{4AD49AA8-AF87-4DBE-8563-C8FDA319A4B6}">
+  <ds:schemaRefs>
+    <ds:schemaRef ds:uri="http://purl.org/dc/terms/"/>
+    <ds:schemaRef ds:uri="http://www.w3.org/XML/1998/namespace"/>
+    <ds:schemaRef ds:uri="http://schemas.microsoft.com/office/2006/documentManagement/types"/>
+    <ds:schemaRef ds:uri="http://purl.org/dc/elements/1.1/"/>
+    <ds:schemaRef ds:uri="http://schemas.microsoft.com/office/infopath/2007/PartnerControls"/>
+    <ds:schemaRef ds:uri="http://schemas.openxmlformats.org/package/2006/metadata/core-properties"/>
+    <ds:schemaRef ds:uri="b70022d4-b627-41d2-93d7-06879fa40a5c"/>
+    <ds:schemaRef ds:uri="http://schemas.microsoft.com/office/2006/metadata/properties"/>
+    <ds:schemaRef ds:uri="http://purl.org/dc/dcmitype/"/>
+  </ds:schemaRefs>
+</ds:datastoreItem>
 </file>
</xml_diff>

<commit_message>
update with new KFF colors
</commit_message>
<xml_diff>
--- a/Reference/KFF_colors.pptx
+++ b/Reference/KFF_colors.pptx
@@ -112,16 +112,40 @@
 </p:presentation>
 </file>
 
-<file path=ppt/revisionInfo.xml><?xml version="1.0" encoding="utf-8"?>
-<p1510:revInfo xmlns:a="http://schemas.openxmlformats.org/drawingml/2006/main" xmlns:r="http://schemas.openxmlformats.org/officeDocument/2006/relationships" xmlns:p1510="http://schemas.microsoft.com/office/powerpoint/2015/10/main">
-  <p1510:revLst>
-    <p1510:client id="{769BE024-F92F-493B-B821-B1875758E33A}" v="4" dt="2022-11-03T15:27:29.107"/>
-  </p1510:revLst>
-</p1510:revInfo>
-</file>
-
 <file path=ppt/changesInfos/changesInfo1.xml><?xml version="1.0" encoding="utf-8"?>
 <pc:chgInfo xmlns:a="http://schemas.openxmlformats.org/drawingml/2006/main" xmlns:r="http://schemas.openxmlformats.org/officeDocument/2006/relationships" xmlns:ac="http://schemas.microsoft.com/office/drawing/2013/main/command" xmlns:pc="http://schemas.microsoft.com/office/powerpoint/2013/main/command">
+  <pc:docChgLst>
+    <pc:chgData name="Patrick Drake" userId="4695e51e-8175-410b-be41-3ae9425cc76e" providerId="ADAL" clId="{8642EC68-6718-4CD5-9275-A4D7BE5A490C}"/>
+    <pc:docChg chg="modSld">
+      <pc:chgData name="Patrick Drake" userId="4695e51e-8175-410b-be41-3ae9425cc76e" providerId="ADAL" clId="{8642EC68-6718-4CD5-9275-A4D7BE5A490C}" dt="2023-03-28T19:57:48.625" v="3" actId="1076"/>
+      <pc:docMkLst>
+        <pc:docMk/>
+      </pc:docMkLst>
+      <pc:sldChg chg="modSp mod">
+        <pc:chgData name="Patrick Drake" userId="4695e51e-8175-410b-be41-3ae9425cc76e" providerId="ADAL" clId="{8642EC68-6718-4CD5-9275-A4D7BE5A490C}" dt="2023-03-28T19:57:48.625" v="3" actId="1076"/>
+        <pc:sldMkLst>
+          <pc:docMk/>
+          <pc:sldMk cId="1558752139" sldId="256"/>
+        </pc:sldMkLst>
+        <pc:spChg chg="mod">
+          <ac:chgData name="Patrick Drake" userId="4695e51e-8175-410b-be41-3ae9425cc76e" providerId="ADAL" clId="{8642EC68-6718-4CD5-9275-A4D7BE5A490C}" dt="2023-03-28T19:57:48.625" v="3" actId="1076"/>
+          <ac:spMkLst>
+            <pc:docMk/>
+            <pc:sldMk cId="1558752139" sldId="256"/>
+            <ac:spMk id="12" creationId="{996820F6-E946-43E4-9562-03F67DE07D06}"/>
+          </ac:spMkLst>
+        </pc:spChg>
+        <pc:spChg chg="mod">
+          <ac:chgData name="Patrick Drake" userId="4695e51e-8175-410b-be41-3ae9425cc76e" providerId="ADAL" clId="{8642EC68-6718-4CD5-9275-A4D7BE5A490C}" dt="2023-03-28T19:43:22.784" v="0" actId="207"/>
+          <ac:spMkLst>
+            <pc:docMk/>
+            <pc:sldMk cId="1558752139" sldId="256"/>
+            <ac:spMk id="16" creationId="{046AEDE7-5158-4746-949A-5674B6C0B64F}"/>
+          </ac:spMkLst>
+        </pc:spChg>
+      </pc:sldChg>
+    </pc:docChg>
+  </pc:docChgLst>
   <pc:docChgLst>
     <pc:chgData name="Patrick Drake" userId="4695e51e-8175-410b-be41-3ae9425cc76e" providerId="ADAL" clId="{B0C6DF4E-6BCC-4C73-B56B-312319E14906}"/>
     <pc:docChg chg="custSel modSld">
@@ -616,7 +640,7 @@
           <a:p>
             <a:fld id="{46D519C6-55E0-49FB-B8BB-91DA255A62EC}" type="datetimeFigureOut">
               <a:rPr lang="en-US" smtClean="0"/>
-              <a:t>11/3/2022</a:t>
+              <a:t>3/28/2023</a:t>
             </a:fld>
             <a:endParaRPr lang="en-US"/>
           </a:p>
@@ -814,7 +838,7 @@
           <a:p>
             <a:fld id="{46D519C6-55E0-49FB-B8BB-91DA255A62EC}" type="datetimeFigureOut">
               <a:rPr lang="en-US" smtClean="0"/>
-              <a:t>11/3/2022</a:t>
+              <a:t>3/28/2023</a:t>
             </a:fld>
             <a:endParaRPr lang="en-US"/>
           </a:p>
@@ -1022,7 +1046,7 @@
           <a:p>
             <a:fld id="{46D519C6-55E0-49FB-B8BB-91DA255A62EC}" type="datetimeFigureOut">
               <a:rPr lang="en-US" smtClean="0"/>
-              <a:t>11/3/2022</a:t>
+              <a:t>3/28/2023</a:t>
             </a:fld>
             <a:endParaRPr lang="en-US"/>
           </a:p>
@@ -1220,7 +1244,7 @@
           <a:p>
             <a:fld id="{46D519C6-55E0-49FB-B8BB-91DA255A62EC}" type="datetimeFigureOut">
               <a:rPr lang="en-US" smtClean="0"/>
-              <a:t>11/3/2022</a:t>
+              <a:t>3/28/2023</a:t>
             </a:fld>
             <a:endParaRPr lang="en-US"/>
           </a:p>
@@ -1495,7 +1519,7 @@
           <a:p>
             <a:fld id="{46D519C6-55E0-49FB-B8BB-91DA255A62EC}" type="datetimeFigureOut">
               <a:rPr lang="en-US" smtClean="0"/>
-              <a:t>11/3/2022</a:t>
+              <a:t>3/28/2023</a:t>
             </a:fld>
             <a:endParaRPr lang="en-US"/>
           </a:p>
@@ -1760,7 +1784,7 @@
           <a:p>
             <a:fld id="{46D519C6-55E0-49FB-B8BB-91DA255A62EC}" type="datetimeFigureOut">
               <a:rPr lang="en-US" smtClean="0"/>
-              <a:t>11/3/2022</a:t>
+              <a:t>3/28/2023</a:t>
             </a:fld>
             <a:endParaRPr lang="en-US"/>
           </a:p>
@@ -2172,7 +2196,7 @@
           <a:p>
             <a:fld id="{46D519C6-55E0-49FB-B8BB-91DA255A62EC}" type="datetimeFigureOut">
               <a:rPr lang="en-US" smtClean="0"/>
-              <a:t>11/3/2022</a:t>
+              <a:t>3/28/2023</a:t>
             </a:fld>
             <a:endParaRPr lang="en-US"/>
           </a:p>
@@ -2313,7 +2337,7 @@
           <a:p>
             <a:fld id="{46D519C6-55E0-49FB-B8BB-91DA255A62EC}" type="datetimeFigureOut">
               <a:rPr lang="en-US" smtClean="0"/>
-              <a:t>11/3/2022</a:t>
+              <a:t>3/28/2023</a:t>
             </a:fld>
             <a:endParaRPr lang="en-US"/>
           </a:p>
@@ -2426,7 +2450,7 @@
           <a:p>
             <a:fld id="{46D519C6-55E0-49FB-B8BB-91DA255A62EC}" type="datetimeFigureOut">
               <a:rPr lang="en-US" smtClean="0"/>
-              <a:t>11/3/2022</a:t>
+              <a:t>3/28/2023</a:t>
             </a:fld>
             <a:endParaRPr lang="en-US"/>
           </a:p>
@@ -2737,7 +2761,7 @@
           <a:p>
             <a:fld id="{46D519C6-55E0-49FB-B8BB-91DA255A62EC}" type="datetimeFigureOut">
               <a:rPr lang="en-US" smtClean="0"/>
-              <a:t>11/3/2022</a:t>
+              <a:t>3/28/2023</a:t>
             </a:fld>
             <a:endParaRPr lang="en-US"/>
           </a:p>
@@ -3025,7 +3049,7 @@
           <a:p>
             <a:fld id="{46D519C6-55E0-49FB-B8BB-91DA255A62EC}" type="datetimeFigureOut">
               <a:rPr lang="en-US" smtClean="0"/>
-              <a:t>11/3/2022</a:t>
+              <a:t>3/28/2023</a:t>
             </a:fld>
             <a:endParaRPr lang="en-US"/>
           </a:p>
@@ -3266,7 +3290,7 @@
           <a:p>
             <a:fld id="{46D519C6-55E0-49FB-B8BB-91DA255A62EC}" type="datetimeFigureOut">
               <a:rPr lang="en-US" smtClean="0"/>
-              <a:t>11/3/2022</a:t>
+              <a:t>3/28/2023</a:t>
             </a:fld>
             <a:endParaRPr lang="en-US"/>
           </a:p>
@@ -3747,9 +3771,9 @@
         <p:grpSpPr>
           <a:xfrm>
             <a:off x="1284178" y="2249642"/>
-            <a:ext cx="3011869" cy="2358715"/>
+            <a:ext cx="3011869" cy="2635716"/>
             <a:chOff x="1258052" y="1673392"/>
-            <a:chExt cx="3011869" cy="2358715"/>
+            <a:chExt cx="3011869" cy="2635716"/>
           </a:xfrm>
         </p:grpSpPr>
         <p:pic>
@@ -3952,8 +3976,8 @@
           </p:nvSpPr>
           <p:spPr>
             <a:xfrm>
-              <a:off x="1781925" y="3662775"/>
-              <a:ext cx="2487993" cy="369332"/>
+              <a:off x="1781925" y="3662777"/>
+              <a:ext cx="2487993" cy="646331"/>
             </a:xfrm>
             <a:prstGeom prst="rect">
               <a:avLst/>
@@ -3972,7 +3996,7 @@
               </a:r>
               <a:r>
                 <a:rPr lang="en-US" dirty="0"/>
-                <a:t>(128,187,228)</a:t>
+                <a:t>(128,187,228) #80BBE4</a:t>
               </a:r>
             </a:p>
           </p:txBody>
@@ -4151,7 +4175,7 @@
           <a:lstStyle/>
           <a:p>
             <a:pPr algn="ctr"/>
-            <a:endParaRPr lang="en-US"/>
+            <a:endParaRPr lang="en-US" dirty="0"/>
           </a:p>
         </p:txBody>
       </p:sp>

</xml_diff>